<commit_message>
You're the Final Poster Harry!
Final Version of the Final Poster Finally Poster
</commit_message>
<xml_diff>
--- a/Documentation/Poster/PosterFinal_DigitalDash.pptx
+++ b/Documentation/Poster/PosterFinal_DigitalDash.pptx
@@ -2201,7 +2201,7 @@
         </p:nvSpPr>
         <p:spPr>
           <a:xfrm>
-            <a:off x="5130720" y="249384"/>
+            <a:off x="5130720" y="401784"/>
             <a:ext cx="34070760" cy="4368600"/>
           </a:xfrm>
           <a:prstGeom prst="rect">
@@ -2246,7 +2246,16 @@
                 </a:solidFill>
                 <a:latin typeface="BlairMdITC TT-Medium"/>
               </a:rPr>
-              <a:t>Digital </a:t>
+              <a:t>Digital Dashboard </a:t>
+            </a:r>
+            <a:r>
+              <a:rPr lang="en-US" sz="9600" dirty="0">
+                <a:solidFill>
+                  <a:srgbClr val="FFFFFF"/>
+                </a:solidFill>
+                <a:latin typeface="BlairMdITC TT-Medium"/>
+              </a:rPr>
+              <a:t>for </a:t>
             </a:r>
             <a:r>
               <a:rPr lang="en-US" sz="9600" dirty="0" smtClean="0">
@@ -2255,7 +2264,7 @@
                 </a:solidFill>
                 <a:latin typeface="BlairMdITC TT-Medium"/>
               </a:rPr>
-              <a:t>Dashboard </a:t>
+              <a:t>Formula SAE </a:t>
             </a:r>
             <a:r>
               <a:rPr lang="en-US" sz="9600" dirty="0">
@@ -2264,7 +2273,7 @@
                 </a:solidFill>
                 <a:latin typeface="BlairMdITC TT-Medium"/>
               </a:rPr>
-              <a:t>for </a:t>
+              <a:t>Electric </a:t>
             </a:r>
             <a:r>
               <a:rPr lang="en-US" sz="9600" dirty="0" smtClean="0">
@@ -2273,50 +2282,8 @@
                 </a:solidFill>
                 <a:latin typeface="BlairMdITC TT-Medium"/>
               </a:rPr>
-              <a:t>Formula SAE </a:t>
-            </a:r>
-            <a:r>
-              <a:rPr lang="en-US" sz="9600" dirty="0">
-                <a:solidFill>
-                  <a:srgbClr val="FFFFFF"/>
-                </a:solidFill>
-                <a:latin typeface="BlairMdITC TT-Medium"/>
-              </a:rPr>
-              <a:t>Electric </a:t>
-            </a:r>
-            <a:r>
-              <a:rPr lang="en-US" sz="9600" dirty="0" smtClean="0">
-                <a:solidFill>
-                  <a:srgbClr val="FFFFFF"/>
-                </a:solidFill>
-                <a:latin typeface="BlairMdITC TT-Medium"/>
-              </a:rPr>
-              <a:t>Race</a:t>
-            </a:r>
-            <a:r>
-              <a:rPr lang="en-US" sz="9600" dirty="0" smtClean="0">
-                <a:solidFill>
-                  <a:srgbClr val="FFFFFF"/>
-                </a:solidFill>
-                <a:latin typeface="BlairMdITC TT-Medium"/>
-              </a:rPr>
-              <a:t>c</a:t>
-            </a:r>
-            <a:r>
-              <a:rPr lang="en-US" sz="9600" dirty="0" smtClean="0">
-                <a:solidFill>
-                  <a:srgbClr val="FFFFFF"/>
-                </a:solidFill>
-                <a:latin typeface="BlairMdITC TT-Medium"/>
-              </a:rPr>
-              <a:t>ar</a:t>
-            </a:r>
-            <a:endParaRPr lang="en-US" sz="9600" dirty="0" smtClean="0">
-              <a:solidFill>
-                <a:srgbClr val="FFFFFF"/>
-              </a:solidFill>
-              <a:latin typeface="BlairMdITC TT-Medium"/>
-            </a:endParaRPr>
+              <a:t>Racecar</a:t>
+            </a:r>
           </a:p>
           <a:p>
             <a:pPr algn="ctr">
@@ -2606,17 +2573,8 @@
               <a:rPr lang="en-US" sz="3400" dirty="0" smtClean="0">
                 <a:latin typeface="Calibri" panose="020F0502020204030204" pitchFamily="34" charset="0"/>
               </a:rPr>
-              <a:t>The Controller Area Network (CAN) bus is one of several central networking protocols that are used in the automotive industry.  </a:t>
-            </a:r>
-            <a:r>
-              <a:rPr lang="en-US" sz="3400" dirty="0" smtClean="0">
-                <a:latin typeface="Calibri" panose="020F0502020204030204" pitchFamily="34" charset="0"/>
-              </a:rPr>
-              <a:t>Implementing the CAN protocol allows the vehicles subsystems to communicate between each other. </a:t>
-            </a:r>
-            <a:endParaRPr lang="en-US" sz="3400" dirty="0" smtClean="0">
-              <a:latin typeface="Calibri" panose="020F0502020204030204" pitchFamily="34" charset="0"/>
-            </a:endParaRPr>
+              <a:t>The Controller Area Network (CAN) bus is one of several central networking protocols that are used in the automotive industry.  Implementing the CAN protocol allows the vehicles subsystems to communicate between each other. </a:t>
+            </a:r>
           </a:p>
         </p:txBody>
       </p:sp>
@@ -3117,7 +3075,177 @@
                 </a:solidFill>
                 <a:latin typeface="Calibri"/>
               </a:rPr>
-              <a:t>systems</a:t>
+              <a:t>systems. This allows the user to view more detailed information about  the vehicles’ respective subsystems.   The screen layout was kept as simple as possible to allow the driver to quickly glance at the screen and interpret the data.(Figure 6)</a:t>
+            </a:r>
+            <a:endParaRPr sz="3400" dirty="0"/>
+          </a:p>
+        </p:txBody>
+      </p:sp>
+      <p:sp>
+        <p:nvSpPr>
+          <p:cNvPr id="71" name="CustomShape 25"/>
+          <p:cNvSpPr/>
+          <p:nvPr/>
+        </p:nvSpPr>
+        <p:spPr>
+          <a:xfrm>
+            <a:off x="980933" y="7103400"/>
+            <a:ext cx="12668960" cy="8571443"/>
+          </a:xfrm>
+          <a:prstGeom prst="rect">
+            <a:avLst/>
+          </a:prstGeom>
+          <a:noFill/>
+          <a:ln>
+            <a:noFill/>
+          </a:ln>
+        </p:spPr>
+        <p:txBody>
+          <a:bodyPr/>
+          <a:lstStyle/>
+          <a:p>
+            <a:pPr algn="just">
+              <a:lnSpc>
+                <a:spcPct val="100000"/>
+              </a:lnSpc>
+            </a:pPr>
+            <a:r>
+              <a:rPr lang="en-US" sz="3400" dirty="0" smtClean="0">
+                <a:solidFill>
+                  <a:srgbClr val="000000"/>
+                </a:solidFill>
+                <a:latin typeface="Calibri" panose="020F0502020204030204" pitchFamily="34" charset="0"/>
+              </a:rPr>
+              <a:t>The </a:t>
+            </a:r>
+            <a:r>
+              <a:rPr lang="en-US" sz="3400" dirty="0">
+                <a:solidFill>
+                  <a:srgbClr val="000000"/>
+                </a:solidFill>
+                <a:latin typeface="Calibri" panose="020F0502020204030204" pitchFamily="34" charset="0"/>
+              </a:rPr>
+              <a:t>Viking Motorsports </a:t>
+            </a:r>
+            <a:r>
+              <a:rPr lang="en-US" sz="3400" dirty="0" smtClean="0">
+                <a:solidFill>
+                  <a:srgbClr val="000000"/>
+                </a:solidFill>
+                <a:latin typeface="Calibri" panose="020F0502020204030204" pitchFamily="34" charset="0"/>
+              </a:rPr>
+              <a:t>Electrical Vehicle (Figure 1) uses an array </a:t>
+            </a:r>
+            <a:r>
+              <a:rPr lang="en-US" sz="3400" dirty="0">
+                <a:solidFill>
+                  <a:srgbClr val="000000"/>
+                </a:solidFill>
+                <a:latin typeface="Calibri" panose="020F0502020204030204" pitchFamily="34" charset="0"/>
+              </a:rPr>
+              <a:t>of LEDs to indicate </a:t>
+            </a:r>
+            <a:r>
+              <a:rPr lang="en-US" sz="3400" dirty="0" smtClean="0">
+                <a:solidFill>
+                  <a:srgbClr val="000000"/>
+                </a:solidFill>
+                <a:latin typeface="Calibri" panose="020F0502020204030204" pitchFamily="34" charset="0"/>
+              </a:rPr>
+              <a:t>problems with </a:t>
+            </a:r>
+            <a:r>
+              <a:rPr lang="en-US" sz="3400" dirty="0">
+                <a:solidFill>
+                  <a:srgbClr val="000000"/>
+                </a:solidFill>
+                <a:latin typeface="Calibri" panose="020F0502020204030204" pitchFamily="34" charset="0"/>
+              </a:rPr>
+              <a:t>mission critical </a:t>
+            </a:r>
+            <a:r>
+              <a:rPr lang="en-US" sz="3400" dirty="0" smtClean="0">
+                <a:solidFill>
+                  <a:srgbClr val="000000"/>
+                </a:solidFill>
+                <a:latin typeface="Calibri" panose="020F0502020204030204" pitchFamily="34" charset="0"/>
+              </a:rPr>
+              <a:t>systems. (Figure 2) </a:t>
+            </a:r>
+            <a:r>
+              <a:rPr lang="en-US" sz="3400" dirty="0">
+                <a:solidFill>
+                  <a:srgbClr val="000000"/>
+                </a:solidFill>
+                <a:latin typeface="Calibri"/>
+              </a:rPr>
+              <a:t>The increased complexity that high voltage systems introduce into a racecar require increased diagnostics to keep the car running safely and correctly. </a:t>
+            </a:r>
+            <a:r>
+              <a:rPr lang="en-US" sz="3400" dirty="0" smtClean="0">
+                <a:latin typeface="Calibri" panose="020F0502020204030204" pitchFamily="34" charset="0"/>
+              </a:rPr>
+              <a:t>The </a:t>
+            </a:r>
+            <a:r>
+              <a:rPr lang="en-US" sz="3400" dirty="0">
+                <a:latin typeface="Calibri" panose="020F0502020204030204" pitchFamily="34" charset="0"/>
+              </a:rPr>
+              <a:t>driver </a:t>
+            </a:r>
+            <a:r>
+              <a:rPr lang="en-US" sz="3400" dirty="0" smtClean="0">
+                <a:latin typeface="Calibri" panose="020F0502020204030204" pitchFamily="34" charset="0"/>
+              </a:rPr>
+              <a:t>must have the </a:t>
+            </a:r>
+            <a:r>
+              <a:rPr lang="en-US" sz="3400" dirty="0">
+                <a:latin typeface="Calibri" panose="020F0502020204030204" pitchFamily="34" charset="0"/>
+              </a:rPr>
+              <a:t>status of </a:t>
+            </a:r>
+            <a:r>
+              <a:rPr lang="en-US" sz="3400" dirty="0" smtClean="0">
+                <a:latin typeface="Calibri" panose="020F0502020204030204" pitchFamily="34" charset="0"/>
+              </a:rPr>
+              <a:t>all important subsystems visible to clearly see and determine the vital faults, </a:t>
+            </a:r>
+            <a:r>
+              <a:rPr lang="en-US" sz="3400" dirty="0">
+                <a:latin typeface="Calibri" panose="020F0502020204030204" pitchFamily="34" charset="0"/>
+              </a:rPr>
+              <a:t>so they can </a:t>
+            </a:r>
+            <a:r>
+              <a:rPr lang="en-US" sz="3400" dirty="0" smtClean="0">
+                <a:latin typeface="Calibri" panose="020F0502020204030204" pitchFamily="34" charset="0"/>
+              </a:rPr>
+              <a:t>adjust their</a:t>
+            </a:r>
+            <a:r>
+              <a:rPr lang="en-US" sz="3400" dirty="0">
+                <a:latin typeface="Calibri" panose="020F0502020204030204" pitchFamily="34" charset="0"/>
+              </a:rPr>
+              <a:t> </a:t>
+            </a:r>
+            <a:r>
+              <a:rPr lang="en-US" sz="3400" dirty="0" smtClean="0">
+                <a:latin typeface="Calibri" panose="020F0502020204030204" pitchFamily="34" charset="0"/>
+              </a:rPr>
+              <a:t>driving </a:t>
+            </a:r>
+            <a:r>
+              <a:rPr lang="en-US" sz="3400" dirty="0">
+                <a:latin typeface="Calibri" panose="020F0502020204030204" pitchFamily="34" charset="0"/>
+              </a:rPr>
+              <a:t>style </a:t>
+            </a:r>
+            <a:r>
+              <a:rPr lang="en-US" sz="3400" dirty="0" smtClean="0">
+                <a:latin typeface="Calibri" panose="020F0502020204030204" pitchFamily="34" charset="0"/>
+              </a:rPr>
+              <a:t>as necessary. </a:t>
             </a:r>
             <a:r>
               <a:rPr lang="en-US" sz="3400" dirty="0" smtClean="0">
@@ -3126,267 +3254,7 @@
                 </a:solidFill>
                 <a:latin typeface="Calibri"/>
               </a:rPr>
-              <a:t>. This allows the user to view more detailed information about  the vehicles’ respective subsystems.   </a:t>
-            </a:r>
-            <a:r>
-              <a:rPr lang="en-US" sz="3400" dirty="0" smtClean="0">
-                <a:solidFill>
-                  <a:srgbClr val="000000"/>
-                </a:solidFill>
-                <a:latin typeface="Calibri"/>
-              </a:rPr>
-              <a:t>The screen </a:t>
-            </a:r>
-            <a:r>
-              <a:rPr lang="en-US" sz="3400" dirty="0" smtClean="0">
-                <a:solidFill>
-                  <a:srgbClr val="000000"/>
-                </a:solidFill>
-                <a:latin typeface="Calibri"/>
-              </a:rPr>
-              <a:t>layout was </a:t>
-            </a:r>
-            <a:r>
-              <a:rPr lang="en-US" sz="3400" dirty="0" smtClean="0">
-                <a:solidFill>
-                  <a:srgbClr val="000000"/>
-                </a:solidFill>
-                <a:latin typeface="Calibri"/>
-              </a:rPr>
-              <a:t>kept as simple as </a:t>
-            </a:r>
-            <a:r>
-              <a:rPr lang="en-US" sz="3400" dirty="0" smtClean="0">
-                <a:solidFill>
-                  <a:srgbClr val="000000"/>
-                </a:solidFill>
-                <a:latin typeface="Calibri"/>
-              </a:rPr>
-              <a:t>possible to allow </a:t>
-            </a:r>
-            <a:r>
-              <a:rPr lang="en-US" sz="3400" dirty="0" smtClean="0">
-                <a:solidFill>
-                  <a:srgbClr val="000000"/>
-                </a:solidFill>
-                <a:latin typeface="Calibri"/>
-              </a:rPr>
-              <a:t>the driver to quickly glance at the screen </a:t>
-            </a:r>
-            <a:r>
-              <a:rPr lang="en-US" sz="3400" dirty="0" smtClean="0">
-                <a:solidFill>
-                  <a:srgbClr val="000000"/>
-                </a:solidFill>
-                <a:latin typeface="Calibri"/>
-              </a:rPr>
-              <a:t>and interpret the data.(Figure </a:t>
-            </a:r>
-            <a:r>
-              <a:rPr lang="en-US" sz="3400" dirty="0" smtClean="0">
-                <a:solidFill>
-                  <a:srgbClr val="000000"/>
-                </a:solidFill>
-                <a:latin typeface="Calibri"/>
-              </a:rPr>
-              <a:t>6)</a:t>
-            </a:r>
-            <a:endParaRPr sz="3400" dirty="0"/>
-          </a:p>
-        </p:txBody>
-      </p:sp>
-      <p:sp>
-        <p:nvSpPr>
-          <p:cNvPr id="71" name="CustomShape 25"/>
-          <p:cNvSpPr/>
-          <p:nvPr/>
-        </p:nvSpPr>
-        <p:spPr>
-          <a:xfrm>
-            <a:off x="980933" y="7103400"/>
-            <a:ext cx="12668960" cy="8571443"/>
-          </a:xfrm>
-          <a:prstGeom prst="rect">
-            <a:avLst/>
-          </a:prstGeom>
-          <a:noFill/>
-          <a:ln>
-            <a:noFill/>
-          </a:ln>
-        </p:spPr>
-        <p:txBody>
-          <a:bodyPr/>
-          <a:lstStyle/>
-          <a:p>
-            <a:pPr algn="just">
-              <a:lnSpc>
-                <a:spcPct val="100000"/>
-              </a:lnSpc>
-            </a:pPr>
-            <a:r>
-              <a:rPr lang="en-US" sz="3400" dirty="0" smtClean="0">
-                <a:solidFill>
-                  <a:srgbClr val="000000"/>
-                </a:solidFill>
-                <a:latin typeface="Calibri" panose="020F0502020204030204" pitchFamily="34" charset="0"/>
-              </a:rPr>
-              <a:t>The </a:t>
-            </a:r>
-            <a:r>
-              <a:rPr lang="en-US" sz="3400" dirty="0">
-                <a:solidFill>
-                  <a:srgbClr val="000000"/>
-                </a:solidFill>
-                <a:latin typeface="Calibri" panose="020F0502020204030204" pitchFamily="34" charset="0"/>
-              </a:rPr>
-              <a:t>Viking Motorsports </a:t>
-            </a:r>
-            <a:r>
-              <a:rPr lang="en-US" sz="3400" dirty="0" smtClean="0">
-                <a:solidFill>
-                  <a:srgbClr val="000000"/>
-                </a:solidFill>
-                <a:latin typeface="Calibri" panose="020F0502020204030204" pitchFamily="34" charset="0"/>
-              </a:rPr>
-              <a:t>Electrical Vehicle (Figure 1) uses an array </a:t>
-            </a:r>
-            <a:r>
-              <a:rPr lang="en-US" sz="3400" dirty="0">
-                <a:solidFill>
-                  <a:srgbClr val="000000"/>
-                </a:solidFill>
-                <a:latin typeface="Calibri" panose="020F0502020204030204" pitchFamily="34" charset="0"/>
-              </a:rPr>
-              <a:t>of LEDs to indicate </a:t>
-            </a:r>
-            <a:r>
-              <a:rPr lang="en-US" sz="3400" dirty="0" smtClean="0">
-                <a:solidFill>
-                  <a:srgbClr val="000000"/>
-                </a:solidFill>
-                <a:latin typeface="Calibri" panose="020F0502020204030204" pitchFamily="34" charset="0"/>
-              </a:rPr>
-              <a:t>problems with </a:t>
-            </a:r>
-            <a:r>
-              <a:rPr lang="en-US" sz="3400" dirty="0">
-                <a:solidFill>
-                  <a:srgbClr val="000000"/>
-                </a:solidFill>
-                <a:latin typeface="Calibri" panose="020F0502020204030204" pitchFamily="34" charset="0"/>
-              </a:rPr>
-              <a:t>mission critical </a:t>
-            </a:r>
-            <a:r>
-              <a:rPr lang="en-US" sz="3400" dirty="0" smtClean="0">
-                <a:solidFill>
-                  <a:srgbClr val="000000"/>
-                </a:solidFill>
-                <a:latin typeface="Calibri" panose="020F0502020204030204" pitchFamily="34" charset="0"/>
-              </a:rPr>
-              <a:t>systems. (Figure 2) </a:t>
-            </a:r>
-            <a:r>
-              <a:rPr lang="en-US" sz="3400" dirty="0">
-                <a:solidFill>
-                  <a:srgbClr val="000000"/>
-                </a:solidFill>
-                <a:latin typeface="Calibri"/>
-              </a:rPr>
-              <a:t>The increased complexity that high voltage systems introduce into a racecar require increased diagnostics to keep the car running safely and correctly. </a:t>
-            </a:r>
-            <a:r>
-              <a:rPr lang="en-US" sz="3400" dirty="0" smtClean="0">
-                <a:latin typeface="Calibri" panose="020F0502020204030204" pitchFamily="34" charset="0"/>
-              </a:rPr>
-              <a:t>The </a:t>
-            </a:r>
-            <a:r>
-              <a:rPr lang="en-US" sz="3400" dirty="0">
-                <a:latin typeface="Calibri" panose="020F0502020204030204" pitchFamily="34" charset="0"/>
-              </a:rPr>
-              <a:t>driver </a:t>
-            </a:r>
-            <a:r>
-              <a:rPr lang="en-US" sz="3400" dirty="0" smtClean="0">
-                <a:latin typeface="Calibri" panose="020F0502020204030204" pitchFamily="34" charset="0"/>
-              </a:rPr>
-              <a:t>must have the </a:t>
-            </a:r>
-            <a:r>
-              <a:rPr lang="en-US" sz="3400" dirty="0">
-                <a:latin typeface="Calibri" panose="020F0502020204030204" pitchFamily="34" charset="0"/>
-              </a:rPr>
-              <a:t>status of </a:t>
-            </a:r>
-            <a:r>
-              <a:rPr lang="en-US" sz="3400" dirty="0" smtClean="0">
-                <a:latin typeface="Calibri" panose="020F0502020204030204" pitchFamily="34" charset="0"/>
-              </a:rPr>
-              <a:t>all important subsystems visible to clearly see and determine the vital faults, </a:t>
-            </a:r>
-            <a:r>
-              <a:rPr lang="en-US" sz="3400" dirty="0">
-                <a:latin typeface="Calibri" panose="020F0502020204030204" pitchFamily="34" charset="0"/>
-              </a:rPr>
-              <a:t>so they can </a:t>
-            </a:r>
-            <a:r>
-              <a:rPr lang="en-US" sz="3400" dirty="0" smtClean="0">
-                <a:latin typeface="Calibri" panose="020F0502020204030204" pitchFamily="34" charset="0"/>
-              </a:rPr>
-              <a:t>adjust their</a:t>
-            </a:r>
-            <a:r>
-              <a:rPr lang="en-US" sz="3400" dirty="0">
-                <a:latin typeface="Calibri" panose="020F0502020204030204" pitchFamily="34" charset="0"/>
-              </a:rPr>
-              <a:t> </a:t>
-            </a:r>
-            <a:r>
-              <a:rPr lang="en-US" sz="3400" dirty="0" smtClean="0">
-                <a:latin typeface="Calibri" panose="020F0502020204030204" pitchFamily="34" charset="0"/>
-              </a:rPr>
-              <a:t>driving </a:t>
-            </a:r>
-            <a:r>
-              <a:rPr lang="en-US" sz="3400" dirty="0">
-                <a:latin typeface="Calibri" panose="020F0502020204030204" pitchFamily="34" charset="0"/>
-              </a:rPr>
-              <a:t>style </a:t>
-            </a:r>
-            <a:r>
-              <a:rPr lang="en-US" sz="3400" dirty="0" smtClean="0">
-                <a:latin typeface="Calibri" panose="020F0502020204030204" pitchFamily="34" charset="0"/>
-              </a:rPr>
-              <a:t>as necessary. </a:t>
-            </a:r>
-            <a:r>
-              <a:rPr lang="en-US" sz="3400" dirty="0" smtClean="0">
-                <a:solidFill>
-                  <a:srgbClr val="000000"/>
-                </a:solidFill>
-                <a:latin typeface="Calibri"/>
-              </a:rPr>
-              <a:t>With an updated dash system detailed information can be displayed in real time from the vehicle control </a:t>
-            </a:r>
-            <a:r>
-              <a:rPr lang="en-US" sz="3400" dirty="0" smtClean="0">
-                <a:solidFill>
-                  <a:srgbClr val="000000"/>
-                </a:solidFill>
-                <a:latin typeface="Calibri"/>
-              </a:rPr>
-              <a:t>unit. The </a:t>
-            </a:r>
-            <a:r>
-              <a:rPr lang="en-US" sz="3400" dirty="0" smtClean="0">
-                <a:solidFill>
-                  <a:srgbClr val="000000"/>
-                </a:solidFill>
-                <a:latin typeface="Calibri"/>
-              </a:rPr>
-              <a:t>driver can be kept up to date on system functionality both on track or in the pits.</a:t>
+              <a:t>With an updated dash system detailed information can be displayed in real time from the vehicle control unit. The driver can be kept up to date on system functionality both on track or in the pits.</a:t>
             </a:r>
             <a:endParaRPr lang="en-US" sz="3400" dirty="0" smtClean="0"/>
           </a:p>
@@ -3515,79 +3383,7 @@
                 </a:solidFill>
                 <a:latin typeface="Calibri"/>
               </a:rPr>
-              <a:t>The digital </a:t>
-            </a:r>
-            <a:r>
-              <a:rPr lang="en-US" sz="3400" dirty="0" smtClean="0">
-                <a:solidFill>
-                  <a:srgbClr val="000000"/>
-                </a:solidFill>
-                <a:latin typeface="Calibri"/>
-              </a:rPr>
-              <a:t>dashboard </a:t>
-            </a:r>
-            <a:r>
-              <a:rPr lang="en-US" sz="3400" dirty="0" smtClean="0">
-                <a:solidFill>
-                  <a:srgbClr val="000000"/>
-                </a:solidFill>
-                <a:latin typeface="Calibri"/>
-              </a:rPr>
-              <a:t>performs as </a:t>
-            </a:r>
-            <a:r>
-              <a:rPr lang="en-US" sz="3400" dirty="0" smtClean="0">
-                <a:solidFill>
-                  <a:srgbClr val="000000"/>
-                </a:solidFill>
-                <a:latin typeface="Calibri"/>
-              </a:rPr>
-              <a:t>intended when simulated with </a:t>
-            </a:r>
-            <a:r>
-              <a:rPr lang="en-US" sz="3400" dirty="0" smtClean="0">
-                <a:solidFill>
-                  <a:srgbClr val="000000"/>
-                </a:solidFill>
-                <a:latin typeface="Calibri"/>
-              </a:rPr>
-              <a:t>the demo </a:t>
-            </a:r>
-            <a:r>
-              <a:rPr lang="en-US" sz="3400" dirty="0" smtClean="0">
-                <a:solidFill>
-                  <a:srgbClr val="000000"/>
-                </a:solidFill>
-                <a:latin typeface="Calibri"/>
-              </a:rPr>
-              <a:t>program</a:t>
-            </a:r>
-            <a:r>
-              <a:rPr lang="en-US" sz="3400" dirty="0" smtClean="0">
-                <a:solidFill>
-                  <a:srgbClr val="000000"/>
-                </a:solidFill>
-                <a:latin typeface="Calibri"/>
-              </a:rPr>
-              <a:t> </a:t>
-            </a:r>
-            <a:r>
-              <a:rPr lang="en-US" sz="3400" dirty="0" smtClean="0">
-                <a:solidFill>
-                  <a:srgbClr val="000000"/>
-                </a:solidFill>
-                <a:latin typeface="Calibri"/>
-              </a:rPr>
-              <a:t>that </a:t>
-            </a:r>
-            <a:r>
-              <a:rPr lang="en-US" sz="3400" dirty="0" smtClean="0">
-                <a:solidFill>
-                  <a:srgbClr val="000000"/>
-                </a:solidFill>
-                <a:latin typeface="Calibri"/>
-              </a:rPr>
-              <a:t>we created. Instead of testing all functionally of the screen, the demo program focuses on only the most important functions. </a:t>
+              <a:t>The digital dashboard performs as intended when simulated with the demo program that we created. Instead of testing all functionally of the screen, the demo program focuses on only the most important functions. </a:t>
             </a:r>
           </a:p>
           <a:p>
@@ -3616,133 +3412,7 @@
                 </a:solidFill>
                 <a:latin typeface="Calibri"/>
               </a:rPr>
-              <a:t>Due </a:t>
-            </a:r>
-            <a:r>
-              <a:rPr lang="en-US" sz="3400" dirty="0" smtClean="0">
-                <a:solidFill>
-                  <a:srgbClr val="000000"/>
-                </a:solidFill>
-                <a:latin typeface="Calibri"/>
-              </a:rPr>
-              <a:t>to </a:t>
-            </a:r>
-            <a:r>
-              <a:rPr lang="en-US" sz="3400" dirty="0" smtClean="0">
-                <a:solidFill>
-                  <a:srgbClr val="000000"/>
-                </a:solidFill>
-                <a:latin typeface="Calibri"/>
-              </a:rPr>
-              <a:t>circumstances </a:t>
-            </a:r>
-            <a:r>
-              <a:rPr lang="en-US" sz="3400" dirty="0" smtClean="0">
-                <a:solidFill>
-                  <a:srgbClr val="000000"/>
-                </a:solidFill>
-                <a:latin typeface="Calibri"/>
-              </a:rPr>
-              <a:t>outside </a:t>
-            </a:r>
-            <a:r>
-              <a:rPr lang="en-US" sz="3400" dirty="0" smtClean="0">
-                <a:solidFill>
-                  <a:srgbClr val="000000"/>
-                </a:solidFill>
-                <a:latin typeface="Calibri"/>
-              </a:rPr>
-              <a:t>of our control, </a:t>
-            </a:r>
-            <a:r>
-              <a:rPr lang="en-US" sz="3400" dirty="0" smtClean="0">
-                <a:solidFill>
-                  <a:srgbClr val="000000"/>
-                </a:solidFill>
-                <a:latin typeface="Calibri"/>
-              </a:rPr>
-              <a:t>the digital </a:t>
-            </a:r>
-            <a:r>
-              <a:rPr lang="en-US" sz="3400" dirty="0" smtClean="0">
-                <a:solidFill>
-                  <a:srgbClr val="000000"/>
-                </a:solidFill>
-                <a:latin typeface="Calibri"/>
-              </a:rPr>
-              <a:t>dashboard has </a:t>
-            </a:r>
-            <a:r>
-              <a:rPr lang="en-US" sz="3400" dirty="0" smtClean="0">
-                <a:solidFill>
-                  <a:srgbClr val="000000"/>
-                </a:solidFill>
-                <a:latin typeface="Calibri"/>
-              </a:rPr>
-              <a:t>not been </a:t>
-            </a:r>
-            <a:r>
-              <a:rPr lang="en-US" sz="3400" dirty="0" smtClean="0">
-                <a:solidFill>
-                  <a:srgbClr val="000000"/>
-                </a:solidFill>
-                <a:latin typeface="Calibri"/>
-              </a:rPr>
-              <a:t>officially tested </a:t>
-            </a:r>
-            <a:r>
-              <a:rPr lang="en-US" sz="3400" dirty="0" smtClean="0">
-                <a:solidFill>
-                  <a:srgbClr val="000000"/>
-                </a:solidFill>
-                <a:latin typeface="Calibri"/>
-              </a:rPr>
-              <a:t>on the electric vehicle </a:t>
-            </a:r>
-            <a:r>
-              <a:rPr lang="en-US" sz="3400" dirty="0" smtClean="0">
-                <a:solidFill>
-                  <a:srgbClr val="000000"/>
-                </a:solidFill>
-                <a:latin typeface="Calibri"/>
-              </a:rPr>
-              <a:t>but </a:t>
-            </a:r>
-            <a:r>
-              <a:rPr lang="en-US" sz="3400" dirty="0" smtClean="0">
-                <a:solidFill>
-                  <a:srgbClr val="000000"/>
-                </a:solidFill>
-                <a:latin typeface="Calibri"/>
-              </a:rPr>
-              <a:t>we are confident that it </a:t>
-            </a:r>
-            <a:r>
-              <a:rPr lang="en-US" sz="3400" dirty="0" smtClean="0">
-                <a:solidFill>
-                  <a:srgbClr val="000000"/>
-                </a:solidFill>
-                <a:latin typeface="Calibri"/>
-              </a:rPr>
-              <a:t>would </a:t>
-            </a:r>
-            <a:r>
-              <a:rPr lang="en-US" sz="3400" dirty="0" smtClean="0">
-                <a:solidFill>
-                  <a:srgbClr val="000000"/>
-                </a:solidFill>
-                <a:latin typeface="Calibri"/>
-              </a:rPr>
-              <a:t>function</a:t>
-            </a:r>
-            <a:r>
-              <a:rPr lang="en-US" sz="3400" dirty="0" smtClean="0">
-                <a:solidFill>
-                  <a:srgbClr val="000000"/>
-                </a:solidFill>
-                <a:latin typeface="Calibri"/>
-              </a:rPr>
-              <a:t> correctly. </a:t>
+              <a:t>Due to circumstances outside of our control, the digital dashboard has not been officially tested on the electric vehicle but we are confident that it would function correctly. </a:t>
             </a:r>
             <a:endParaRPr sz="3400" dirty="0"/>
           </a:p>
@@ -3788,13 +3458,7 @@
               <a:rPr lang="en-US" sz="4800" b="1" dirty="0" smtClean="0">
                 <a:latin typeface="BlairMdITC TT-Medium"/>
               </a:rPr>
-              <a:t>Acknowledgements</a:t>
-            </a:r>
-            <a:r>
-              <a:rPr lang="en-US" sz="4800" b="1" dirty="0" smtClean="0">
-                <a:latin typeface="BlairMdITC TT-Medium"/>
-              </a:rPr>
-              <a:t>: </a:t>
+              <a:t>Acknowledgements: </a:t>
             </a:r>
             <a:r>
               <a:rPr lang="en-US" sz="4800" dirty="0">
@@ -3830,13 +3494,7 @@
               <a:rPr lang="en-US" sz="4800" dirty="0" smtClean="0">
                 <a:latin typeface="BlairMdITC TT-Medium"/>
               </a:rPr>
-              <a:t>Team </a:t>
-            </a:r>
-            <a:r>
-              <a:rPr lang="en-US" sz="4800" dirty="0" smtClean="0">
-                <a:latin typeface="BlairMdITC TT-Medium"/>
-              </a:rPr>
-              <a:t>  </a:t>
+              <a:t>Team   </a:t>
             </a:r>
             <a:endParaRPr sz="1100" dirty="0"/>
           </a:p>
@@ -4546,31 +4204,7 @@
               <a:rPr lang="en-US" sz="3400" dirty="0" smtClean="0">
                 <a:latin typeface="Calibri" panose="020F0502020204030204" pitchFamily="34" charset="0"/>
               </a:rPr>
-              <a:t>A custom PCB was fabricated to fit in the limited space allocated for the dash in the vehicle.  The layout of the board was </a:t>
-            </a:r>
-            <a:r>
-              <a:rPr lang="en-US" sz="3400" dirty="0" smtClean="0">
-                <a:latin typeface="Calibri" panose="020F0502020204030204" pitchFamily="34" charset="0"/>
-              </a:rPr>
-              <a:t>designed so </a:t>
-            </a:r>
-            <a:r>
-              <a:rPr lang="en-US" sz="3400" dirty="0" smtClean="0">
-                <a:latin typeface="Calibri" panose="020F0502020204030204" pitchFamily="34" charset="0"/>
-              </a:rPr>
-              <a:t>the control pins of the LCD would connect directly with the header affixed on the </a:t>
-            </a:r>
-            <a:r>
-              <a:rPr lang="en-US" sz="3400" dirty="0" smtClean="0">
-                <a:latin typeface="Calibri" panose="020F0502020204030204" pitchFamily="34" charset="0"/>
-              </a:rPr>
-              <a:t>board. Our board was created by modifying the existing Arduino Due design. (Figure </a:t>
-            </a:r>
-            <a:r>
-              <a:rPr lang="en-US" sz="3400" dirty="0" smtClean="0">
-                <a:latin typeface="Calibri" panose="020F0502020204030204" pitchFamily="34" charset="0"/>
-              </a:rPr>
-              <a:t>5)</a:t>
+              <a:t>A custom PCB was fabricated to fit in the limited space allocated for the dash in the vehicle.  The layout of the board was designed so the control pins of the LCD would connect directly with the header affixed on the board. Our board was created by modifying the existing Arduino Due design. (Figure 5)</a:t>
             </a:r>
             <a:endParaRPr lang="en-US" sz="3400" dirty="0">
               <a:latin typeface="Calibri" panose="020F0502020204030204" pitchFamily="34" charset="0"/>
@@ -4835,9 +4469,6 @@
               </a:rPr>
               <a:t>were able to use last years car as a test platform. During this time we were able to determine that messages from one of the two CAN networks were successfully being received and interpreted.</a:t>
             </a:r>
-            <a:endParaRPr lang="en-US" sz="3400" dirty="0" smtClean="0">
-              <a:latin typeface="Calibri" panose="020F0502020204030204" pitchFamily="34" charset="0"/>
-            </a:endParaRPr>
           </a:p>
           <a:p>
             <a:pPr algn="just"/>
@@ -4851,83 +4482,8 @@
               <a:rPr lang="en-US" sz="3400" dirty="0" smtClean="0">
                 <a:latin typeface="Calibri" panose="020F0502020204030204" pitchFamily="34" charset="0"/>
               </a:rPr>
-              <a:t>In the second </a:t>
-            </a:r>
-            <a:r>
-              <a:rPr lang="en-US" sz="3400" dirty="0" smtClean="0">
-                <a:latin typeface="Calibri" panose="020F0502020204030204" pitchFamily="34" charset="0"/>
-              </a:rPr>
-              <a:t>half of the </a:t>
-            </a:r>
-            <a:r>
-              <a:rPr lang="en-US" sz="3400" dirty="0" smtClean="0">
-                <a:latin typeface="Calibri" panose="020F0502020204030204" pitchFamily="34" charset="0"/>
-              </a:rPr>
-              <a:t>development </a:t>
-            </a:r>
-            <a:r>
-              <a:rPr lang="en-US" sz="3400" dirty="0" smtClean="0">
-                <a:latin typeface="Calibri" panose="020F0502020204030204" pitchFamily="34" charset="0"/>
-              </a:rPr>
-              <a:t>cycle we </a:t>
-            </a:r>
-            <a:r>
-              <a:rPr lang="en-US" sz="3400" dirty="0" smtClean="0">
-                <a:latin typeface="Calibri" panose="020F0502020204030204" pitchFamily="34" charset="0"/>
-              </a:rPr>
-              <a:t>did not have </a:t>
-            </a:r>
-            <a:r>
-              <a:rPr lang="en-US" sz="3400" dirty="0" smtClean="0">
-                <a:latin typeface="Calibri" panose="020F0502020204030204" pitchFamily="34" charset="0"/>
-              </a:rPr>
-              <a:t>access to a functioning </a:t>
-            </a:r>
-            <a:r>
-              <a:rPr lang="en-US" sz="3400" dirty="0" smtClean="0">
-                <a:latin typeface="Calibri" panose="020F0502020204030204" pitchFamily="34" charset="0"/>
-              </a:rPr>
-              <a:t>test vehicle</a:t>
-            </a:r>
-            <a:r>
-              <a:rPr lang="en-US" sz="3400" dirty="0" smtClean="0">
-                <a:latin typeface="Calibri" panose="020F0502020204030204" pitchFamily="34" charset="0"/>
-              </a:rPr>
-              <a:t>. </a:t>
-            </a:r>
-            <a:r>
-              <a:rPr lang="en-US" sz="3400" dirty="0" smtClean="0">
-                <a:latin typeface="Calibri" panose="020F0502020204030204" pitchFamily="34" charset="0"/>
-              </a:rPr>
-              <a:t>To </a:t>
-            </a:r>
-            <a:r>
-              <a:rPr lang="en-US" sz="3400" dirty="0" smtClean="0">
-                <a:latin typeface="Calibri" panose="020F0502020204030204" pitchFamily="34" charset="0"/>
-              </a:rPr>
-              <a:t>determine if the digital </a:t>
-            </a:r>
-            <a:r>
-              <a:rPr lang="en-US" sz="3400" dirty="0" smtClean="0">
-                <a:latin typeface="Calibri" panose="020F0502020204030204" pitchFamily="34" charset="0"/>
-              </a:rPr>
-              <a:t>dashboard worked, </a:t>
-            </a:r>
-            <a:r>
-              <a:rPr lang="en-US" sz="3400" dirty="0" smtClean="0">
-                <a:latin typeface="Calibri" panose="020F0502020204030204" pitchFamily="34" charset="0"/>
-              </a:rPr>
-              <a:t>we developed </a:t>
-            </a:r>
-            <a:r>
-              <a:rPr lang="en-US" sz="3400" dirty="0" smtClean="0">
-                <a:latin typeface="Calibri" panose="020F0502020204030204" pitchFamily="34" charset="0"/>
-              </a:rPr>
-              <a:t>a demo program to send out  simulated messages that behaved similarly to the vehicles subsystems.</a:t>
-            </a:r>
-            <a:endParaRPr lang="en-US" sz="3400" dirty="0" smtClean="0">
-              <a:latin typeface="Calibri" panose="020F0502020204030204" pitchFamily="34" charset="0"/>
-            </a:endParaRPr>
+              <a:t>In the second half of the development cycle we did not have access to a functioning test vehicle. To determine if the digital dashboard worked, we developed a demo program to send out  simulated messages that behaved similarly to the vehicles subsystems.</a:t>
+            </a:r>
           </a:p>
           <a:p>
             <a:pPr algn="just"/>
@@ -4961,13 +4517,8 @@
           <a:p>
             <a:r>
               <a:rPr lang="en-US" sz="2400" dirty="0" smtClean="0"/>
-              <a:t>Figure 7</a:t>
-            </a:r>
-            <a:r>
-              <a:rPr lang="en-US" sz="2400" dirty="0" smtClean="0"/>
-              <a:t>: Block Diagram for Demo System</a:t>
-            </a:r>
-            <a:endParaRPr lang="en-US" sz="2400" dirty="0" smtClean="0"/>
+              <a:t>Figure 7: Block Diagram for Demo System</a:t>
+            </a:r>
           </a:p>
         </p:txBody>
       </p:sp>
@@ -5215,13 +4766,8 @@
                 <a:pPr algn="ctr"/>
                 <a:r>
                   <a:rPr lang="en-US" dirty="0" smtClean="0"/>
-                  <a:t>Data </a:t>
+                  <a:t>Data Input</a:t>
                 </a:r>
-                <a:r>
-                  <a:rPr lang="en-US" dirty="0" smtClean="0"/>
-                  <a:t>Input</a:t>
-                </a:r>
-                <a:endParaRPr lang="en-US" dirty="0" smtClean="0"/>
               </a:p>
               <a:p>
                 <a:pPr algn="ctr"/>

</xml_diff>